<commit_message>
cleaning up someone elses mess...
</commit_message>
<xml_diff>
--- a/Workshops/WelcomePresentation.pptx
+++ b/Workshops/WelcomePresentation.pptx
@@ -206,7 +206,7 @@
           <a:p>
             <a:fld id="{0F9C1CCF-B725-44A7-AA57-5E433BD85C9F}" type="datetimeFigureOut">
               <a:rPr lang="en-US" smtClean="0"/>
-              <a:t>2/17/2018</a:t>
+              <a:t>4/5/2019</a:t>
             </a:fld>
             <a:endParaRPr lang="en-US"/>
           </a:p>
@@ -4694,7 +4694,7 @@
       </p:grpSpPr>
       <p:pic>
         <p:nvPicPr>
-          <p:cNvPr descr="../Images/Clinician%20Coders%20Branding_FINAL_CMYK_Colour.png" id="0" name="Picture 1"/>
+          <p:cNvPr descr="../Images/ClinicianCodersBranding_FINAL_CMYK_Colour.png" id="0" name="Picture 1"/>
           <p:cNvPicPr>
             <a:picLocks noGrp="1" noChangeAspect="1"/>
           </p:cNvPicPr>
@@ -5490,7 +5490,17 @@
             <a:pPr lvl="1"/>
             <a:r>
               <a:rPr/>
-              <a:t>A pdf file will be uploaded to the Slack channel after this presentation. It contains all of the content from the course workshops for future reference.</a:t>
+              <a:t>A pdf file is available on the GitHub: </a:t>
+            </a:r>
+            <a:r>
+              <a:rPr>
+                <a:hlinkClick r:id="rId2"/>
+              </a:rPr>
+              <a:t>https://github.com/datascibc/ClinicianCoders/blob/master/Handout.pdf</a:t>
+            </a:r>
+            <a:r>
+              <a:rPr/>
+              <a:t>. It contains all of the content from the course workshops for future reference.</a:t>
             </a:r>
           </a:p>
         </p:txBody>
@@ -5644,7 +5654,7 @@
               <a:t>Check your punctuation (e.g. placement of </a:t>
             </a:r>
             <a:r>
-              <a:rPr sz="1800">
+              <a:rPr>
                 <a:latin typeface="Courier"/>
               </a:rPr>
               <a:t>()</a:t>
@@ -5654,7 +5664,7 @@
               <a:t> or </a:t>
             </a:r>
             <a:r>
-              <a:rPr sz="1800">
+              <a:rPr>
                 <a:latin typeface="Courier"/>
               </a:rPr>
               <a:t>,</a:t>
@@ -5668,10 +5678,10 @@
             <a:pPr lvl="2"/>
             <a:r>
               <a:rPr/>
-              <a:t>Capitalisation matters (e.g. </a:t>
-            </a:r>
-            <a:r>
-              <a:rPr sz="1800">
+              <a:t>Capitalisation matters (e.g. </a:t>
+            </a:r>
+            <a:r>
+              <a:rPr>
                 <a:latin typeface="Courier"/>
               </a:rPr>
               <a:t>Data</a:t>
@@ -5681,7 +5691,7 @@
               <a:t> vs </a:t>
             </a:r>
             <a:r>
-              <a:rPr sz="1800">
+              <a:rPr>
                 <a:latin typeface="Courier"/>
               </a:rPr>
               <a:t>data</a:t>

</xml_diff>